<commit_message>
actualizacion inicio de dia
</commit_message>
<xml_diff>
--- a/documentacion/fichas_curriculares/chiapasf/CHIAPAS.pptx
+++ b/documentacion/fichas_curriculares/chiapasf/CHIAPAS.pptx
@@ -6,6 +6,7 @@
   </p:sldMasterIdLst>
   <p:sldIdLst>
     <p:sldId id="256" r:id="rId2"/>
+    <p:sldId id="257" r:id="rId3"/>
   </p:sldIdLst>
   <p:sldSz cx="6858000" cy="9144000" type="letter"/>
   <p:notesSz cx="7023100" cy="9309100"/>
@@ -112,6 +113,99 @@
 </p:presentation>
 </file>
 
+<file path=ppt/revisionInfo.xml><?xml version="1.0" encoding="utf-8"?>
+<p1510:revInfo xmlns:a="http://schemas.openxmlformats.org/drawingml/2006/main" xmlns:r="http://schemas.openxmlformats.org/officeDocument/2006/relationships" xmlns:p1510="http://schemas.microsoft.com/office/powerpoint/2015/10/main">
+  <p1510:revLst>
+    <p1510:client id="{47EBEFFC-F259-40C6-A5B1-C960E28A514C}" v="1" dt="2025-04-28T16:45:09.655"/>
+  </p1510:revLst>
+</p1510:revInfo>
+</file>
+
+<file path=ppt/changesInfos/changesInfo1.xml><?xml version="1.0" encoding="utf-8"?>
+<pc:chgInfo xmlns:a="http://schemas.openxmlformats.org/drawingml/2006/main" xmlns:r="http://schemas.openxmlformats.org/officeDocument/2006/relationships" xmlns:ac="http://schemas.microsoft.com/office/drawing/2013/main/command" xmlns:pc="http://schemas.microsoft.com/office/powerpoint/2013/main/command">
+  <pc:docChgLst>
+    <pc:chgData name="Guillermo Jiménez Gómez" userId="e8e1a3bb2d1e013b" providerId="LiveId" clId="{47EBEFFC-F259-40C6-A5B1-C960E28A514C}"/>
+    <pc:docChg chg="undo custSel addSld modSld">
+      <pc:chgData name="Guillermo Jiménez Gómez" userId="e8e1a3bb2d1e013b" providerId="LiveId" clId="{47EBEFFC-F259-40C6-A5B1-C960E28A514C}" dt="2025-04-28T16:45:28.214" v="11" actId="478"/>
+      <pc:docMkLst>
+        <pc:docMk/>
+      </pc:docMkLst>
+      <pc:sldChg chg="addSp delSp add mod">
+        <pc:chgData name="Guillermo Jiménez Gómez" userId="e8e1a3bb2d1e013b" providerId="LiveId" clId="{47EBEFFC-F259-40C6-A5B1-C960E28A514C}" dt="2025-04-28T16:45:28.214" v="11" actId="478"/>
+        <pc:sldMkLst>
+          <pc:docMk/>
+          <pc:sldMk cId="37153050" sldId="257"/>
+        </pc:sldMkLst>
+        <pc:spChg chg="del">
+          <ac:chgData name="Guillermo Jiménez Gómez" userId="e8e1a3bb2d1e013b" providerId="LiveId" clId="{47EBEFFC-F259-40C6-A5B1-C960E28A514C}" dt="2025-04-28T16:45:18.380" v="4" actId="478"/>
+          <ac:spMkLst>
+            <pc:docMk/>
+            <pc:sldMk cId="37153050" sldId="257"/>
+            <ac:spMk id="13" creationId="{5EF1F5CB-BCFF-A06B-FA51-8B735D975AB6}"/>
+          </ac:spMkLst>
+        </pc:spChg>
+        <pc:spChg chg="del">
+          <ac:chgData name="Guillermo Jiménez Gómez" userId="e8e1a3bb2d1e013b" providerId="LiveId" clId="{47EBEFFC-F259-40C6-A5B1-C960E28A514C}" dt="2025-04-28T16:45:19.831" v="5" actId="478"/>
+          <ac:spMkLst>
+            <pc:docMk/>
+            <pc:sldMk cId="37153050" sldId="257"/>
+            <ac:spMk id="17" creationId="{5EC2BC5B-32B2-F6AF-00CE-1917C4121B14}"/>
+          </ac:spMkLst>
+        </pc:spChg>
+        <pc:spChg chg="del">
+          <ac:chgData name="Guillermo Jiménez Gómez" userId="e8e1a3bb2d1e013b" providerId="LiveId" clId="{47EBEFFC-F259-40C6-A5B1-C960E28A514C}" dt="2025-04-28T16:45:27.137" v="10" actId="478"/>
+          <ac:spMkLst>
+            <pc:docMk/>
+            <pc:sldMk cId="37153050" sldId="257"/>
+            <ac:spMk id="18" creationId="{18ABFBAB-E1F7-511B-A15F-F3FC74A17D5C}"/>
+          </ac:spMkLst>
+        </pc:spChg>
+        <pc:spChg chg="del">
+          <ac:chgData name="Guillermo Jiménez Gómez" userId="e8e1a3bb2d1e013b" providerId="LiveId" clId="{47EBEFFC-F259-40C6-A5B1-C960E28A514C}" dt="2025-04-28T16:45:12.931" v="1" actId="478"/>
+          <ac:spMkLst>
+            <pc:docMk/>
+            <pc:sldMk cId="37153050" sldId="257"/>
+            <ac:spMk id="20" creationId="{21E75456-5120-015E-A784-0F4E9AF73F0D}"/>
+          </ac:spMkLst>
+        </pc:spChg>
+        <pc:spChg chg="del">
+          <ac:chgData name="Guillermo Jiménez Gómez" userId="e8e1a3bb2d1e013b" providerId="LiveId" clId="{47EBEFFC-F259-40C6-A5B1-C960E28A514C}" dt="2025-04-28T16:45:25.174" v="8" actId="478"/>
+          <ac:spMkLst>
+            <pc:docMk/>
+            <pc:sldMk cId="37153050" sldId="257"/>
+            <ac:spMk id="24" creationId="{9C29D63F-6618-4579-56A4-FE0350DB6FE1}"/>
+          </ac:spMkLst>
+        </pc:spChg>
+        <pc:grpChg chg="add del">
+          <ac:chgData name="Guillermo Jiménez Gómez" userId="e8e1a3bb2d1e013b" providerId="LiveId" clId="{47EBEFFC-F259-40C6-A5B1-C960E28A514C}" dt="2025-04-28T16:45:22.893" v="7" actId="478"/>
+          <ac:grpSpMkLst>
+            <pc:docMk/>
+            <pc:sldMk cId="37153050" sldId="257"/>
+            <ac:grpSpMk id="8" creationId="{F60EB51D-8C06-03BA-4F26-020D9164FBAB}"/>
+          </ac:grpSpMkLst>
+        </pc:grpChg>
+        <pc:picChg chg="del">
+          <ac:chgData name="Guillermo Jiménez Gómez" userId="e8e1a3bb2d1e013b" providerId="LiveId" clId="{47EBEFFC-F259-40C6-A5B1-C960E28A514C}" dt="2025-04-28T16:45:25.876" v="9" actId="478"/>
+          <ac:picMkLst>
+            <pc:docMk/>
+            <pc:sldMk cId="37153050" sldId="257"/>
+            <ac:picMk id="16" creationId="{E0BBD616-F2C8-B961-3A7E-C6BDDE6014DC}"/>
+          </ac:picMkLst>
+        </pc:picChg>
+        <pc:picChg chg="del">
+          <ac:chgData name="Guillermo Jiménez Gómez" userId="e8e1a3bb2d1e013b" providerId="LiveId" clId="{47EBEFFC-F259-40C6-A5B1-C960E28A514C}" dt="2025-04-28T16:45:28.214" v="11" actId="478"/>
+          <ac:picMkLst>
+            <pc:docMk/>
+            <pc:sldMk cId="37153050" sldId="257"/>
+            <ac:picMk id="21" creationId="{5F565DFB-BDEE-C4E0-6A3F-6893CA0BD332}"/>
+          </ac:picMkLst>
+        </pc:picChg>
+      </pc:sldChg>
+    </pc:docChg>
+  </pc:docChgLst>
+</pc:chgInfo>
+</file>
+
 <file path=ppt/slideLayouts/slideLayout1.xml><?xml version="1.0" encoding="utf-8"?>
 <p:sldLayout xmlns:a="http://schemas.openxmlformats.org/drawingml/2006/main" xmlns:r="http://schemas.openxmlformats.org/officeDocument/2006/relationships" xmlns:p="http://schemas.openxmlformats.org/presentationml/2006/main" type="title" preserve="1">
   <p:cSld name="Diapositiva de título">
@@ -259,7 +353,7 @@
           <a:p>
             <a:fld id="{664CB750-BDA0-4B3C-9407-BAF21E562682}" type="datetimeFigureOut">
               <a:rPr lang="es-MX" smtClean="0"/>
-              <a:t>24.04.2025</a:t>
+              <a:t>28/04/2025</a:t>
             </a:fld>
             <a:endParaRPr lang="es-MX"/>
           </a:p>
@@ -457,7 +551,7 @@
           <a:p>
             <a:fld id="{664CB750-BDA0-4B3C-9407-BAF21E562682}" type="datetimeFigureOut">
               <a:rPr lang="es-MX" smtClean="0"/>
-              <a:t>24.04.2025</a:t>
+              <a:t>28/04/2025</a:t>
             </a:fld>
             <a:endParaRPr lang="es-MX"/>
           </a:p>
@@ -665,7 +759,7 @@
           <a:p>
             <a:fld id="{664CB750-BDA0-4B3C-9407-BAF21E562682}" type="datetimeFigureOut">
               <a:rPr lang="es-MX" smtClean="0"/>
-              <a:t>24.04.2025</a:t>
+              <a:t>28/04/2025</a:t>
             </a:fld>
             <a:endParaRPr lang="es-MX"/>
           </a:p>
@@ -863,7 +957,7 @@
           <a:p>
             <a:fld id="{664CB750-BDA0-4B3C-9407-BAF21E562682}" type="datetimeFigureOut">
               <a:rPr lang="es-MX" smtClean="0"/>
-              <a:t>24.04.2025</a:t>
+              <a:t>28/04/2025</a:t>
             </a:fld>
             <a:endParaRPr lang="es-MX"/>
           </a:p>
@@ -1138,7 +1232,7 @@
           <a:p>
             <a:fld id="{664CB750-BDA0-4B3C-9407-BAF21E562682}" type="datetimeFigureOut">
               <a:rPr lang="es-MX" smtClean="0"/>
-              <a:t>24.04.2025</a:t>
+              <a:t>28/04/2025</a:t>
             </a:fld>
             <a:endParaRPr lang="es-MX"/>
           </a:p>
@@ -1403,7 +1497,7 @@
           <a:p>
             <a:fld id="{664CB750-BDA0-4B3C-9407-BAF21E562682}" type="datetimeFigureOut">
               <a:rPr lang="es-MX" smtClean="0"/>
-              <a:t>24.04.2025</a:t>
+              <a:t>28/04/2025</a:t>
             </a:fld>
             <a:endParaRPr lang="es-MX"/>
           </a:p>
@@ -1815,7 +1909,7 @@
           <a:p>
             <a:fld id="{664CB750-BDA0-4B3C-9407-BAF21E562682}" type="datetimeFigureOut">
               <a:rPr lang="es-MX" smtClean="0"/>
-              <a:t>24.04.2025</a:t>
+              <a:t>28/04/2025</a:t>
             </a:fld>
             <a:endParaRPr lang="es-MX"/>
           </a:p>
@@ -1956,7 +2050,7 @@
           <a:p>
             <a:fld id="{664CB750-BDA0-4B3C-9407-BAF21E562682}" type="datetimeFigureOut">
               <a:rPr lang="es-MX" smtClean="0"/>
-              <a:t>24.04.2025</a:t>
+              <a:t>28/04/2025</a:t>
             </a:fld>
             <a:endParaRPr lang="es-MX"/>
           </a:p>
@@ -2069,7 +2163,7 @@
           <a:p>
             <a:fld id="{664CB750-BDA0-4B3C-9407-BAF21E562682}" type="datetimeFigureOut">
               <a:rPr lang="es-MX" smtClean="0"/>
-              <a:t>24.04.2025</a:t>
+              <a:t>28/04/2025</a:t>
             </a:fld>
             <a:endParaRPr lang="es-MX"/>
           </a:p>
@@ -2380,7 +2474,7 @@
           <a:p>
             <a:fld id="{664CB750-BDA0-4B3C-9407-BAF21E562682}" type="datetimeFigureOut">
               <a:rPr lang="es-MX" smtClean="0"/>
-              <a:t>24.04.2025</a:t>
+              <a:t>28/04/2025</a:t>
             </a:fld>
             <a:endParaRPr lang="es-MX"/>
           </a:p>
@@ -2668,7 +2762,7 @@
           <a:p>
             <a:fld id="{664CB750-BDA0-4B3C-9407-BAF21E562682}" type="datetimeFigureOut">
               <a:rPr lang="es-MX" smtClean="0"/>
-              <a:t>24.04.2025</a:t>
+              <a:t>28/04/2025</a:t>
             </a:fld>
             <a:endParaRPr lang="es-MX"/>
           </a:p>
@@ -2909,7 +3003,7 @@
           <a:p>
             <a:fld id="{664CB750-BDA0-4B3C-9407-BAF21E562682}" type="datetimeFigureOut">
               <a:rPr lang="es-MX" smtClean="0"/>
-              <a:t>24.04.2025</a:t>
+              <a:t>28/04/2025</a:t>
             </a:fld>
             <a:endParaRPr lang="es-MX"/>
           </a:p>
@@ -4747,6 +4841,164 @@
 </p:sld>
 </file>
 
+<file path=ppt/slides/slide2.xml><?xml version="1.0" encoding="utf-8"?>
+<p:sld xmlns:a="http://schemas.openxmlformats.org/drawingml/2006/main" xmlns:r="http://schemas.openxmlformats.org/officeDocument/2006/relationships" xmlns:p="http://schemas.openxmlformats.org/presentationml/2006/main">
+  <p:cSld>
+    <p:spTree>
+      <p:nvGrpSpPr>
+        <p:cNvPr id="1" name="">
+          <a:extLst>
+            <a:ext uri="{FF2B5EF4-FFF2-40B4-BE49-F238E27FC236}">
+              <a16:creationId xmlns:a16="http://schemas.microsoft.com/office/drawing/2014/main" id="{FED7CA36-EAFE-0456-1FBB-79B755A74F95}"/>
+            </a:ext>
+          </a:extLst>
+        </p:cNvPr>
+        <p:cNvGrpSpPr/>
+        <p:nvPr/>
+      </p:nvGrpSpPr>
+      <p:grpSpPr>
+        <a:xfrm>
+          <a:off x="0" y="0"/>
+          <a:ext cx="0" cy="0"/>
+          <a:chOff x="0" y="0"/>
+          <a:chExt cx="0" cy="0"/>
+        </a:xfrm>
+      </p:grpSpPr>
+      <p:grpSp>
+        <p:nvGrpSpPr>
+          <p:cNvPr id="8" name="Grupo 7">
+            <a:extLst>
+              <a:ext uri="{FF2B5EF4-FFF2-40B4-BE49-F238E27FC236}">
+                <a16:creationId xmlns:a16="http://schemas.microsoft.com/office/drawing/2014/main" id="{F60EB51D-8C06-03BA-4F26-020D9164FBAB}"/>
+              </a:ext>
+            </a:extLst>
+          </p:cNvPr>
+          <p:cNvGrpSpPr/>
+          <p:nvPr/>
+        </p:nvGrpSpPr>
+        <p:grpSpPr>
+          <a:xfrm>
+            <a:off x="171495" y="261026"/>
+            <a:ext cx="2066553" cy="8621948"/>
+            <a:chOff x="440430" y="261026"/>
+            <a:chExt cx="2381885" cy="8621948"/>
+          </a:xfrm>
+        </p:grpSpPr>
+        <p:pic>
+          <p:nvPicPr>
+            <p:cNvPr id="4" name="Imagen 3">
+              <a:extLst>
+                <a:ext uri="{FF2B5EF4-FFF2-40B4-BE49-F238E27FC236}">
+                  <a16:creationId xmlns:a16="http://schemas.microsoft.com/office/drawing/2014/main" id="{F2FCC48D-283A-9027-99A5-38985D119BDD}"/>
+                </a:ext>
+              </a:extLst>
+            </p:cNvPr>
+            <p:cNvPicPr/>
+            <p:nvPr/>
+          </p:nvPicPr>
+          <p:blipFill>
+            <a:blip r:embed="rId2">
+              <a:extLst>
+                <a:ext uri="{28A0092B-C50C-407E-A947-70E740481C1C}">
+                  <a14:useLocalDpi xmlns:a14="http://schemas.microsoft.com/office/drawing/2010/main" val="0"/>
+                </a:ext>
+              </a:extLst>
+            </a:blip>
+            <a:stretch>
+              <a:fillRect/>
+            </a:stretch>
+          </p:blipFill>
+          <p:spPr>
+            <a:xfrm>
+              <a:off x="440430" y="261026"/>
+              <a:ext cx="2381885" cy="4332212"/>
+            </a:xfrm>
+            <a:prstGeom prst="rect">
+              <a:avLst/>
+            </a:prstGeom>
+          </p:spPr>
+        </p:pic>
+        <p:pic>
+          <p:nvPicPr>
+            <p:cNvPr id="5" name="Imagen 4">
+              <a:extLst>
+                <a:ext uri="{FF2B5EF4-FFF2-40B4-BE49-F238E27FC236}">
+                  <a16:creationId xmlns:a16="http://schemas.microsoft.com/office/drawing/2014/main" id="{07AA081C-B824-CCD1-64CB-679274D6F397}"/>
+                </a:ext>
+              </a:extLst>
+            </p:cNvPr>
+            <p:cNvPicPr/>
+            <p:nvPr/>
+          </p:nvPicPr>
+          <p:blipFill>
+            <a:blip r:embed="rId2">
+              <a:extLst>
+                <a:ext uri="{28A0092B-C50C-407E-A947-70E740481C1C}">
+                  <a14:useLocalDpi xmlns:a14="http://schemas.microsoft.com/office/drawing/2010/main" val="0"/>
+                </a:ext>
+              </a:extLst>
+            </a:blip>
+            <a:stretch>
+              <a:fillRect/>
+            </a:stretch>
+          </p:blipFill>
+          <p:spPr>
+            <a:xfrm>
+              <a:off x="440430" y="4550762"/>
+              <a:ext cx="2381885" cy="4332212"/>
+            </a:xfrm>
+            <a:prstGeom prst="rect">
+              <a:avLst/>
+            </a:prstGeom>
+          </p:spPr>
+        </p:pic>
+      </p:grpSp>
+      <p:pic>
+        <p:nvPicPr>
+          <p:cNvPr id="22" name="0 Imagen">
+            <a:extLst>
+              <a:ext uri="{FF2B5EF4-FFF2-40B4-BE49-F238E27FC236}">
+                <a16:creationId xmlns:a16="http://schemas.microsoft.com/office/drawing/2014/main" id="{3A88216E-771F-733B-2CD6-486C4D77C3E2}"/>
+              </a:ext>
+            </a:extLst>
+          </p:cNvPr>
+          <p:cNvPicPr/>
+          <p:nvPr/>
+        </p:nvPicPr>
+        <p:blipFill rotWithShape="1">
+          <a:blip r:embed="rId3">
+            <a:extLst>
+              <a:ext uri="{28A0092B-C50C-407E-A947-70E740481C1C}">
+                <a14:useLocalDpi xmlns:a14="http://schemas.microsoft.com/office/drawing/2010/main" val="0"/>
+              </a:ext>
+            </a:extLst>
+          </a:blip>
+          <a:srcRect l="6381" r="6381"/>
+          <a:stretch/>
+        </p:blipFill>
+        <p:spPr>
+          <a:xfrm>
+            <a:off x="0" y="8498541"/>
+            <a:ext cx="6858000" cy="534245"/>
+          </a:xfrm>
+          <a:prstGeom prst="rect">
+            <a:avLst/>
+          </a:prstGeom>
+        </p:spPr>
+      </p:pic>
+    </p:spTree>
+    <p:extLst>
+      <p:ext uri="{BB962C8B-B14F-4D97-AF65-F5344CB8AC3E}">
+        <p14:creationId xmlns:p14="http://schemas.microsoft.com/office/powerpoint/2010/main" val="37153050"/>
+      </p:ext>
+    </p:extLst>
+  </p:cSld>
+  <p:clrMapOvr>
+    <a:masterClrMapping/>
+  </p:clrMapOvr>
+</p:sld>
+</file>
+
 <file path=ppt/theme/theme1.xml><?xml version="1.0" encoding="utf-8"?>
 <a:theme xmlns:a="http://schemas.openxmlformats.org/drawingml/2006/main" name="Tema de Office">
   <a:themeElements>

</xml_diff>